<commit_message>
Final Presentation - Design Overall Finished -> Starting Implementation
</commit_message>
<xml_diff>
--- a/PowerPoint-Presentation/web-guard-scanner-presentation.pptx
+++ b/PowerPoint-Presentation/web-guard-scanner-presentation.pptx
@@ -260,7 +260,7 @@
           <a:p>
             <a:fld id="{E82AC39B-AEF8-47A6-997C-02F38BF17500}" type="datetimeFigureOut">
               <a:rPr lang="en-US" smtClean="0"/>
-              <a:t>11/23/2025</a:t>
+              <a:t>11/25/2025</a:t>
             </a:fld>
             <a:endParaRPr lang="en-US"/>
           </a:p>
@@ -430,7 +430,7 @@
           <a:p>
             <a:fld id="{E82AC39B-AEF8-47A6-997C-02F38BF17500}" type="datetimeFigureOut">
               <a:rPr lang="en-US" smtClean="0"/>
-              <a:t>11/23/2025</a:t>
+              <a:t>11/25/2025</a:t>
             </a:fld>
             <a:endParaRPr lang="en-US"/>
           </a:p>
@@ -610,7 +610,7 @@
           <a:p>
             <a:fld id="{E82AC39B-AEF8-47A6-997C-02F38BF17500}" type="datetimeFigureOut">
               <a:rPr lang="en-US" smtClean="0"/>
-              <a:t>11/23/2025</a:t>
+              <a:t>11/25/2025</a:t>
             </a:fld>
             <a:endParaRPr lang="en-US"/>
           </a:p>
@@ -780,7 +780,7 @@
           <a:p>
             <a:fld id="{E82AC39B-AEF8-47A6-997C-02F38BF17500}" type="datetimeFigureOut">
               <a:rPr lang="en-US" smtClean="0"/>
-              <a:t>11/23/2025</a:t>
+              <a:t>11/25/2025</a:t>
             </a:fld>
             <a:endParaRPr lang="en-US"/>
           </a:p>
@@ -1024,7 +1024,7 @@
           <a:p>
             <a:fld id="{E82AC39B-AEF8-47A6-997C-02F38BF17500}" type="datetimeFigureOut">
               <a:rPr lang="en-US" smtClean="0"/>
-              <a:t>11/23/2025</a:t>
+              <a:t>11/25/2025</a:t>
             </a:fld>
             <a:endParaRPr lang="en-US"/>
           </a:p>
@@ -1256,7 +1256,7 @@
           <a:p>
             <a:fld id="{E82AC39B-AEF8-47A6-997C-02F38BF17500}" type="datetimeFigureOut">
               <a:rPr lang="en-US" smtClean="0"/>
-              <a:t>11/23/2025</a:t>
+              <a:t>11/25/2025</a:t>
             </a:fld>
             <a:endParaRPr lang="en-US"/>
           </a:p>
@@ -1623,7 +1623,7 @@
           <a:p>
             <a:fld id="{E82AC39B-AEF8-47A6-997C-02F38BF17500}" type="datetimeFigureOut">
               <a:rPr lang="en-US" smtClean="0"/>
-              <a:t>11/23/2025</a:t>
+              <a:t>11/25/2025</a:t>
             </a:fld>
             <a:endParaRPr lang="en-US"/>
           </a:p>
@@ -1741,7 +1741,7 @@
           <a:p>
             <a:fld id="{E82AC39B-AEF8-47A6-997C-02F38BF17500}" type="datetimeFigureOut">
               <a:rPr lang="en-US" smtClean="0"/>
-              <a:t>11/23/2025</a:t>
+              <a:t>11/25/2025</a:t>
             </a:fld>
             <a:endParaRPr lang="en-US"/>
           </a:p>
@@ -1836,7 +1836,7 @@
           <a:p>
             <a:fld id="{E82AC39B-AEF8-47A6-997C-02F38BF17500}" type="datetimeFigureOut">
               <a:rPr lang="en-US" smtClean="0"/>
-              <a:t>11/23/2025</a:t>
+              <a:t>11/25/2025</a:t>
             </a:fld>
             <a:endParaRPr lang="en-US"/>
           </a:p>
@@ -2113,7 +2113,7 @@
           <a:p>
             <a:fld id="{E82AC39B-AEF8-47A6-997C-02F38BF17500}" type="datetimeFigureOut">
               <a:rPr lang="en-US" smtClean="0"/>
-              <a:t>11/23/2025</a:t>
+              <a:t>11/25/2025</a:t>
             </a:fld>
             <a:endParaRPr lang="en-US"/>
           </a:p>
@@ -2370,7 +2370,7 @@
           <a:p>
             <a:fld id="{E82AC39B-AEF8-47A6-997C-02F38BF17500}" type="datetimeFigureOut">
               <a:rPr lang="en-US" smtClean="0"/>
-              <a:t>11/23/2025</a:t>
+              <a:t>11/25/2025</a:t>
             </a:fld>
             <a:endParaRPr lang="en-US"/>
           </a:p>
@@ -2583,7 +2583,7 @@
           <a:p>
             <a:fld id="{E82AC39B-AEF8-47A6-997C-02F38BF17500}" type="datetimeFigureOut">
               <a:rPr lang="en-US" smtClean="0"/>
-              <a:t>11/23/2025</a:t>
+              <a:t>11/25/2025</a:t>
             </a:fld>
             <a:endParaRPr lang="en-US"/>
           </a:p>
@@ -6584,7 +6584,7 @@
         </p:blipFill>
         <p:spPr>
           <a:xfrm>
-            <a:off x="6606026" y="4099469"/>
+            <a:off x="6607447" y="4432576"/>
             <a:ext cx="2777581" cy="2777581"/>
           </a:xfrm>
           <a:prstGeom prst="rect">
@@ -7135,6 +7135,42 @@
           </a:prstGeom>
         </p:spPr>
       </p:pic>
+      <p:pic>
+        <p:nvPicPr>
+          <p:cNvPr id="2" name="Graphic 1">
+            <a:extLst>
+              <a:ext uri="{FF2B5EF4-FFF2-40B4-BE49-F238E27FC236}">
+                <a16:creationId xmlns:a16="http://schemas.microsoft.com/office/drawing/2014/main" id="{6CC64664-6BD9-197A-3A94-A946673EBC0D}"/>
+              </a:ext>
+            </a:extLst>
+          </p:cNvPr>
+          <p:cNvPicPr>
+            <a:picLocks noChangeAspect="1"/>
+          </p:cNvPicPr>
+          <p:nvPr/>
+        </p:nvPicPr>
+        <p:blipFill>
+          <a:blip r:embed="rId4">
+            <a:extLst>
+              <a:ext uri="{96DAC541-7B7A-43D3-8B79-37D633B846F1}">
+                <asvg:svgBlip xmlns:asvg="http://schemas.microsoft.com/office/drawing/2016/SVG/main" r:embed="rId5"/>
+              </a:ext>
+            </a:extLst>
+          </a:blip>
+          <a:stretch>
+            <a:fillRect/>
+          </a:stretch>
+        </p:blipFill>
+        <p:spPr>
+          <a:xfrm>
+            <a:off x="9405199" y="104259"/>
+            <a:ext cx="551838" cy="551838"/>
+          </a:xfrm>
+          <a:prstGeom prst="rect">
+            <a:avLst/>
+          </a:prstGeom>
+        </p:spPr>
+      </p:pic>
     </p:spTree>
     <p:extLst>
       <p:ext uri="{BB962C8B-B14F-4D97-AF65-F5344CB8AC3E}">
@@ -7445,7 +7481,7 @@
         </p:nvSpPr>
         <p:spPr>
           <a:xfrm>
-            <a:off x="5175793" y="2780403"/>
+            <a:off x="5175793" y="2408344"/>
             <a:ext cx="4505325" cy="3539430"/>
           </a:xfrm>
           <a:prstGeom prst="rect">
@@ -7769,6 +7805,134 @@
           </a:effectLst>
         </p:spPr>
       </p:pic>
+      <p:sp>
+        <p:nvSpPr>
+          <p:cNvPr id="2" name="TextBox 1">
+            <a:extLst>
+              <a:ext uri="{FF2B5EF4-FFF2-40B4-BE49-F238E27FC236}">
+                <a16:creationId xmlns:a16="http://schemas.microsoft.com/office/drawing/2014/main" id="{42502D83-D872-601A-CF7D-C2F7C6264C6B}"/>
+              </a:ext>
+            </a:extLst>
+          </p:cNvPr>
+          <p:cNvSpPr txBox="1"/>
+          <p:nvPr/>
+        </p:nvSpPr>
+        <p:spPr>
+          <a:xfrm>
+            <a:off x="5175793" y="6214705"/>
+            <a:ext cx="3986373" cy="954107"/>
+          </a:xfrm>
+          <a:prstGeom prst="rect">
+            <a:avLst/>
+          </a:prstGeom>
+          <a:noFill/>
+        </p:spPr>
+        <p:txBody>
+          <a:bodyPr wrap="square" rtlCol="0">
+            <a:spAutoFit/>
+          </a:bodyPr>
+          <a:lstStyle/>
+          <a:p>
+            <a:r>
+              <a:rPr lang="ro-RO" sz="1400" b="1" dirty="0">
+                <a:solidFill>
+                  <a:srgbClr val="7030A0"/>
+                </a:solidFill>
+                <a:latin typeface="Segoe UI" panose="020B0502040204020203" pitchFamily="34" charset="0"/>
+                <a:cs typeface="Segoe UI" panose="020B0502040204020203" pitchFamily="34" charset="0"/>
+              </a:rPr>
+              <a:t>Țintele alese </a:t>
+            </a:r>
+            <a:r>
+              <a:rPr lang="ro-RO" sz="1400" dirty="0">
+                <a:latin typeface="Segoe UI" panose="020B0502040204020203" pitchFamily="34" charset="0"/>
+                <a:cs typeface="Segoe UI" panose="020B0502040204020203" pitchFamily="34" charset="0"/>
+              </a:rPr>
+              <a:t>pentru scanare, construite special pentru pen-testing, sunt: </a:t>
+            </a:r>
+            <a:r>
+              <a:rPr lang="ro-RO" sz="1400" b="1" dirty="0">
+                <a:solidFill>
+                  <a:srgbClr val="7030A0"/>
+                </a:solidFill>
+                <a:latin typeface="Segoe UI" panose="020B0502040204020203" pitchFamily="34" charset="0"/>
+                <a:cs typeface="Segoe UI" panose="020B0502040204020203" pitchFamily="34" charset="0"/>
+              </a:rPr>
+              <a:t>testfire.net</a:t>
+            </a:r>
+            <a:r>
+              <a:rPr lang="ro-RO" sz="1400" dirty="0">
+                <a:latin typeface="Segoe UI" panose="020B0502040204020203" pitchFamily="34" charset="0"/>
+                <a:cs typeface="Segoe UI" panose="020B0502040204020203" pitchFamily="34" charset="0"/>
+              </a:rPr>
+              <a:t>, </a:t>
+            </a:r>
+            <a:r>
+              <a:rPr lang="ro-RO" sz="1400" b="1" dirty="0">
+                <a:solidFill>
+                  <a:srgbClr val="7030A0"/>
+                </a:solidFill>
+                <a:latin typeface="Segoe UI" panose="020B0502040204020203" pitchFamily="34" charset="0"/>
+                <a:cs typeface="Segoe UI" panose="020B0502040204020203" pitchFamily="34" charset="0"/>
+              </a:rPr>
+              <a:t>testphp.vulnweb.com</a:t>
+            </a:r>
+            <a:r>
+              <a:rPr lang="ro-RO" sz="1400" dirty="0">
+                <a:latin typeface="Segoe UI" panose="020B0502040204020203" pitchFamily="34" charset="0"/>
+                <a:cs typeface="Segoe UI" panose="020B0502040204020203" pitchFamily="34" charset="0"/>
+              </a:rPr>
+              <a:t>.</a:t>
+            </a:r>
+            <a:br>
+              <a:rPr lang="ro-RO" sz="1400" dirty="0">
+                <a:latin typeface="Segoe UI" panose="020B0502040204020203" pitchFamily="34" charset="0"/>
+                <a:cs typeface="Segoe UI" panose="020B0502040204020203" pitchFamily="34" charset="0"/>
+              </a:rPr>
+            </a:br>
+            <a:endParaRPr lang="en-US" sz="1400" dirty="0">
+              <a:latin typeface="Segoe UI" panose="020B0502040204020203" pitchFamily="34" charset="0"/>
+              <a:cs typeface="Segoe UI" panose="020B0502040204020203" pitchFamily="34" charset="0"/>
+            </a:endParaRPr>
+          </a:p>
+        </p:txBody>
+      </p:sp>
+      <p:pic>
+        <p:nvPicPr>
+          <p:cNvPr id="4" name="Graphic 3">
+            <a:extLst>
+              <a:ext uri="{FF2B5EF4-FFF2-40B4-BE49-F238E27FC236}">
+                <a16:creationId xmlns:a16="http://schemas.microsoft.com/office/drawing/2014/main" id="{6BEA1666-9196-397B-401F-B97B07F50930}"/>
+              </a:ext>
+            </a:extLst>
+          </p:cNvPr>
+          <p:cNvPicPr>
+            <a:picLocks noChangeAspect="1"/>
+          </p:cNvPicPr>
+          <p:nvPr/>
+        </p:nvPicPr>
+        <p:blipFill>
+          <a:blip r:embed="rId5">
+            <a:extLst>
+              <a:ext uri="{96DAC541-7B7A-43D3-8B79-37D633B846F1}">
+                <asvg:svgBlip xmlns:asvg="http://schemas.microsoft.com/office/drawing/2016/SVG/main" r:embed="rId6"/>
+              </a:ext>
+            </a:extLst>
+          </a:blip>
+          <a:stretch>
+            <a:fillRect/>
+          </a:stretch>
+        </p:blipFill>
+        <p:spPr>
+          <a:xfrm>
+            <a:off x="9405199" y="104259"/>
+            <a:ext cx="551838" cy="551838"/>
+          </a:xfrm>
+          <a:prstGeom prst="rect">
+            <a:avLst/>
+          </a:prstGeom>
+        </p:spPr>
+      </p:pic>
     </p:spTree>
     <p:extLst>
       <p:ext uri="{BB962C8B-B14F-4D97-AF65-F5344CB8AC3E}">
@@ -7905,7 +8069,7 @@
         <p:spPr>
           <a:xfrm>
             <a:off x="370357" y="1234229"/>
-            <a:ext cx="9310975" cy="523220"/>
+            <a:ext cx="9310975" cy="738664"/>
           </a:xfrm>
           <a:prstGeom prst="rect">
             <a:avLst/>
@@ -7962,7 +8126,7 @@
                 <a:ea typeface="Segoe UI" panose="020B0502040204020203" pitchFamily="34" charset="0"/>
                 <a:cs typeface="Segoe UI" panose="020B0502040204020203" pitchFamily="34" charset="0"/>
               </a:rPr>
-              <a:t>, pentru simplicitate a script-urilor, dar si modernitate și putere, respectiv </a:t>
+              <a:t>, back-end, pentru simplicitate a script-urilor, dar si modernitate și putere, respectiv </a:t>
             </a:r>
             <a:r>
               <a:rPr lang="ro-RO" sz="1400" b="1" noProof="0" dirty="0">
@@ -8264,6 +8428,42 @@
           </a:p>
         </p:txBody>
       </p:sp>
+      <p:pic>
+        <p:nvPicPr>
+          <p:cNvPr id="9" name="Graphic 8">
+            <a:extLst>
+              <a:ext uri="{FF2B5EF4-FFF2-40B4-BE49-F238E27FC236}">
+                <a16:creationId xmlns:a16="http://schemas.microsoft.com/office/drawing/2014/main" id="{140F63EC-6B61-9FC9-E723-4674DCAA60DD}"/>
+              </a:ext>
+            </a:extLst>
+          </p:cNvPr>
+          <p:cNvPicPr>
+            <a:picLocks noChangeAspect="1"/>
+          </p:cNvPicPr>
+          <p:nvPr/>
+        </p:nvPicPr>
+        <p:blipFill>
+          <a:blip r:embed="rId5">
+            <a:extLst>
+              <a:ext uri="{96DAC541-7B7A-43D3-8B79-37D633B846F1}">
+                <asvg:svgBlip xmlns:asvg="http://schemas.microsoft.com/office/drawing/2016/SVG/main" r:embed="rId6"/>
+              </a:ext>
+            </a:extLst>
+          </a:blip>
+          <a:stretch>
+            <a:fillRect/>
+          </a:stretch>
+        </p:blipFill>
+        <p:spPr>
+          <a:xfrm>
+            <a:off x="9405199" y="104259"/>
+            <a:ext cx="551838" cy="551838"/>
+          </a:xfrm>
+          <a:prstGeom prst="rect">
+            <a:avLst/>
+          </a:prstGeom>
+        </p:spPr>
+      </p:pic>
     </p:spTree>
     <p:extLst>
       <p:ext uri="{BB962C8B-B14F-4D97-AF65-F5344CB8AC3E}">
@@ -8484,6 +8684,42 @@
           </a:p>
         </p:txBody>
       </p:sp>
+      <p:pic>
+        <p:nvPicPr>
+          <p:cNvPr id="3" name="Graphic 2">
+            <a:extLst>
+              <a:ext uri="{FF2B5EF4-FFF2-40B4-BE49-F238E27FC236}">
+                <a16:creationId xmlns:a16="http://schemas.microsoft.com/office/drawing/2014/main" id="{B0B8C234-99B9-417A-9919-0CD30E8B3C34}"/>
+              </a:ext>
+            </a:extLst>
+          </p:cNvPr>
+          <p:cNvPicPr>
+            <a:picLocks noChangeAspect="1"/>
+          </p:cNvPicPr>
+          <p:nvPr/>
+        </p:nvPicPr>
+        <p:blipFill>
+          <a:blip r:embed="rId4">
+            <a:extLst>
+              <a:ext uri="{96DAC541-7B7A-43D3-8B79-37D633B846F1}">
+                <asvg:svgBlip xmlns:asvg="http://schemas.microsoft.com/office/drawing/2016/SVG/main" r:embed="rId5"/>
+              </a:ext>
+            </a:extLst>
+          </a:blip>
+          <a:stretch>
+            <a:fillRect/>
+          </a:stretch>
+        </p:blipFill>
+        <p:spPr>
+          <a:xfrm>
+            <a:off x="9405199" y="104259"/>
+            <a:ext cx="551838" cy="551838"/>
+          </a:xfrm>
+          <a:prstGeom prst="rect">
+            <a:avLst/>
+          </a:prstGeom>
+        </p:spPr>
+      </p:pic>
     </p:spTree>
     <p:extLst>
       <p:ext uri="{BB962C8B-B14F-4D97-AF65-F5344CB8AC3E}">
@@ -8774,6 +9010,42 @@
           </a:p>
         </p:txBody>
       </p:sp>
+      <p:pic>
+        <p:nvPicPr>
+          <p:cNvPr id="3" name="Graphic 2">
+            <a:extLst>
+              <a:ext uri="{FF2B5EF4-FFF2-40B4-BE49-F238E27FC236}">
+                <a16:creationId xmlns:a16="http://schemas.microsoft.com/office/drawing/2014/main" id="{0FB02313-4511-FBEF-9BE7-0543572174F0}"/>
+              </a:ext>
+            </a:extLst>
+          </p:cNvPr>
+          <p:cNvPicPr>
+            <a:picLocks noChangeAspect="1"/>
+          </p:cNvPicPr>
+          <p:nvPr/>
+        </p:nvPicPr>
+        <p:blipFill>
+          <a:blip r:embed="rId4">
+            <a:extLst>
+              <a:ext uri="{96DAC541-7B7A-43D3-8B79-37D633B846F1}">
+                <asvg:svgBlip xmlns:asvg="http://schemas.microsoft.com/office/drawing/2016/SVG/main" r:embed="rId5"/>
+              </a:ext>
+            </a:extLst>
+          </a:blip>
+          <a:stretch>
+            <a:fillRect/>
+          </a:stretch>
+        </p:blipFill>
+        <p:spPr>
+          <a:xfrm>
+            <a:off x="9405199" y="104259"/>
+            <a:ext cx="551838" cy="551838"/>
+          </a:xfrm>
+          <a:prstGeom prst="rect">
+            <a:avLst/>
+          </a:prstGeom>
+        </p:spPr>
+      </p:pic>
     </p:spTree>
     <p:extLst>
       <p:ext uri="{BB962C8B-B14F-4D97-AF65-F5344CB8AC3E}">
@@ -9053,6 +9325,42 @@
           </a:p>
         </p:txBody>
       </p:sp>
+      <p:pic>
+        <p:nvPicPr>
+          <p:cNvPr id="2" name="Graphic 1">
+            <a:extLst>
+              <a:ext uri="{FF2B5EF4-FFF2-40B4-BE49-F238E27FC236}">
+                <a16:creationId xmlns:a16="http://schemas.microsoft.com/office/drawing/2014/main" id="{23D303BB-E2E1-ED53-2E14-DCCD3B61343F}"/>
+              </a:ext>
+            </a:extLst>
+          </p:cNvPr>
+          <p:cNvPicPr>
+            <a:picLocks noChangeAspect="1"/>
+          </p:cNvPicPr>
+          <p:nvPr/>
+        </p:nvPicPr>
+        <p:blipFill>
+          <a:blip r:embed="rId4">
+            <a:extLst>
+              <a:ext uri="{96DAC541-7B7A-43D3-8B79-37D633B846F1}">
+                <asvg:svgBlip xmlns:asvg="http://schemas.microsoft.com/office/drawing/2016/SVG/main" r:embed="rId5"/>
+              </a:ext>
+            </a:extLst>
+          </a:blip>
+          <a:stretch>
+            <a:fillRect/>
+          </a:stretch>
+        </p:blipFill>
+        <p:spPr>
+          <a:xfrm>
+            <a:off x="9405199" y="104259"/>
+            <a:ext cx="551838" cy="551838"/>
+          </a:xfrm>
+          <a:prstGeom prst="rect">
+            <a:avLst/>
+          </a:prstGeom>
+        </p:spPr>
+      </p:pic>
     </p:spTree>
     <p:extLst>
       <p:ext uri="{BB962C8B-B14F-4D97-AF65-F5344CB8AC3E}">
@@ -9187,7 +9495,7 @@
         <p:spPr>
           <a:xfrm>
             <a:off x="2039862" y="2645070"/>
-            <a:ext cx="2321960" cy="307777"/>
+            <a:ext cx="2439252" cy="307777"/>
           </a:xfrm>
           <a:prstGeom prst="rect">
             <a:avLst/>
@@ -9205,7 +9513,7 @@
                 <a:latin typeface="Segoe UI" panose="020B0502040204020203" pitchFamily="34" charset="0"/>
                 <a:cs typeface="Segoe UI" panose="020B0502040204020203" pitchFamily="34" charset="0"/>
               </a:rPr>
-              <a:t>Comunicare </a:t>
+              <a:t>Comunicarea </a:t>
             </a:r>
             <a:r>
               <a:rPr lang="ro-RO" sz="1400" b="1" dirty="0">
@@ -9383,7 +9691,7 @@
                 <a:latin typeface="Segoe UI" panose="020B0502040204020203" pitchFamily="34" charset="0"/>
                 <a:cs typeface="Segoe UI" panose="020B0502040204020203" pitchFamily="34" charset="0"/>
               </a:rPr>
-              <a:t>Comunicare </a:t>
+              <a:t>Comunicarea </a:t>
             </a:r>
             <a:r>
               <a:rPr lang="ro-RO" sz="1400" b="1" dirty="0">
@@ -9409,6 +9717,42 @@
           </a:p>
         </p:txBody>
       </p:sp>
+      <p:pic>
+        <p:nvPicPr>
+          <p:cNvPr id="2" name="Graphic 1">
+            <a:extLst>
+              <a:ext uri="{FF2B5EF4-FFF2-40B4-BE49-F238E27FC236}">
+                <a16:creationId xmlns:a16="http://schemas.microsoft.com/office/drawing/2014/main" id="{CAC26389-B980-0420-953C-BE373894BD78}"/>
+              </a:ext>
+            </a:extLst>
+          </p:cNvPr>
+          <p:cNvPicPr>
+            <a:picLocks noChangeAspect="1"/>
+          </p:cNvPicPr>
+          <p:nvPr/>
+        </p:nvPicPr>
+        <p:blipFill>
+          <a:blip r:embed="rId5">
+            <a:extLst>
+              <a:ext uri="{96DAC541-7B7A-43D3-8B79-37D633B846F1}">
+                <asvg:svgBlip xmlns:asvg="http://schemas.microsoft.com/office/drawing/2016/SVG/main" r:embed="rId6"/>
+              </a:ext>
+            </a:extLst>
+          </a:blip>
+          <a:stretch>
+            <a:fillRect/>
+          </a:stretch>
+        </p:blipFill>
+        <p:spPr>
+          <a:xfrm>
+            <a:off x="9405199" y="104259"/>
+            <a:ext cx="551838" cy="551838"/>
+          </a:xfrm>
+          <a:prstGeom prst="rect">
+            <a:avLst/>
+          </a:prstGeom>
+        </p:spPr>
+      </p:pic>
     </p:spTree>
     <p:extLst>
       <p:ext uri="{BB962C8B-B14F-4D97-AF65-F5344CB8AC3E}">
@@ -9534,6 +9878,42 @@
           </a:p>
         </p:txBody>
       </p:sp>
+      <p:pic>
+        <p:nvPicPr>
+          <p:cNvPr id="2" name="Graphic 1">
+            <a:extLst>
+              <a:ext uri="{FF2B5EF4-FFF2-40B4-BE49-F238E27FC236}">
+                <a16:creationId xmlns:a16="http://schemas.microsoft.com/office/drawing/2014/main" id="{600526E6-9536-8E1F-F0AE-451701163F29}"/>
+              </a:ext>
+            </a:extLst>
+          </p:cNvPr>
+          <p:cNvPicPr>
+            <a:picLocks noChangeAspect="1"/>
+          </p:cNvPicPr>
+          <p:nvPr/>
+        </p:nvPicPr>
+        <p:blipFill>
+          <a:blip r:embed="rId3">
+            <a:extLst>
+              <a:ext uri="{96DAC541-7B7A-43D3-8B79-37D633B846F1}">
+                <asvg:svgBlip xmlns:asvg="http://schemas.microsoft.com/office/drawing/2016/SVG/main" r:embed="rId4"/>
+              </a:ext>
+            </a:extLst>
+          </a:blip>
+          <a:stretch>
+            <a:fillRect/>
+          </a:stretch>
+        </p:blipFill>
+        <p:spPr>
+          <a:xfrm>
+            <a:off x="9405199" y="104259"/>
+            <a:ext cx="551838" cy="551838"/>
+          </a:xfrm>
+          <a:prstGeom prst="rect">
+            <a:avLst/>
+          </a:prstGeom>
+        </p:spPr>
+      </p:pic>
     </p:spTree>
     <p:extLst>
       <p:ext uri="{BB962C8B-B14F-4D97-AF65-F5344CB8AC3E}">
@@ -9653,6 +10033,42 @@
           <a:xfrm>
             <a:off x="1452063" y="1723723"/>
             <a:ext cx="7154273" cy="4324954"/>
+          </a:xfrm>
+          <a:prstGeom prst="rect">
+            <a:avLst/>
+          </a:prstGeom>
+        </p:spPr>
+      </p:pic>
+      <p:pic>
+        <p:nvPicPr>
+          <p:cNvPr id="2" name="Graphic 1">
+            <a:extLst>
+              <a:ext uri="{FF2B5EF4-FFF2-40B4-BE49-F238E27FC236}">
+                <a16:creationId xmlns:a16="http://schemas.microsoft.com/office/drawing/2014/main" id="{4B847DA4-9615-8650-8776-E13FB20F1BD9}"/>
+              </a:ext>
+            </a:extLst>
+          </p:cNvPr>
+          <p:cNvPicPr>
+            <a:picLocks noChangeAspect="1"/>
+          </p:cNvPicPr>
+          <p:nvPr/>
+        </p:nvPicPr>
+        <p:blipFill>
+          <a:blip r:embed="rId3">
+            <a:extLst>
+              <a:ext uri="{96DAC541-7B7A-43D3-8B79-37D633B846F1}">
+                <asvg:svgBlip xmlns:asvg="http://schemas.microsoft.com/office/drawing/2016/SVG/main" r:embed="rId4"/>
+              </a:ext>
+            </a:extLst>
+          </a:blip>
+          <a:stretch>
+            <a:fillRect/>
+          </a:stretch>
+        </p:blipFill>
+        <p:spPr>
+          <a:xfrm>
+            <a:off x="9405199" y="104259"/>
+            <a:ext cx="551838" cy="551838"/>
           </a:xfrm>
           <a:prstGeom prst="rect">
             <a:avLst/>
@@ -9934,17 +10350,6 @@
 </file>
 
 <file path=customXml/item1.xml><?xml version="1.0" encoding="utf-8"?>
-<p:properties xmlns:p="http://schemas.microsoft.com/office/2006/metadata/properties" xmlns:xsi="http://www.w3.org/2001/XMLSchema-instance" xmlns:pc="http://schemas.microsoft.com/office/infopath/2007/PartnerControls">
-  <documentManagement>
-    <_ip_UnifiedCompliancePolicyUIAction xmlns="http://schemas.microsoft.com/sharepoint/v3" xsi:nil="true"/>
-    <_STS_x0020_Hashtags xmlns="34f92d76-972f-40f7-83ba-9ff99395c1e2"/>
-    <_ip_UnifiedCompliancePolicyProperties xmlns="http://schemas.microsoft.com/sharepoint/v3" xsi:nil="true"/>
-    <MediaServiceKeyPoints xmlns="34f92d76-972f-40f7-83ba-9ff99395c1e2" xsi:nil="true"/>
-  </documentManagement>
-</p:properties>
-</file>
-
-<file path=customXml/item2.xml><?xml version="1.0" encoding="utf-8"?>
 <ct:contentTypeSchema xmlns:ct="http://schemas.microsoft.com/office/2006/metadata/contentType" xmlns:ma="http://schemas.microsoft.com/office/2006/metadata/properties/metaAttributes" ct:_="" ma:_="" ma:contentTypeName="Document" ma:contentTypeID="0x01010043960AAC9CB38E4D8644DE30D1FEB539" ma:contentTypeVersion="19" ma:contentTypeDescription="Create a new document." ma:contentTypeScope="" ma:versionID="2bead677cef3b09207ed509027f3cc3e">
   <xsd:schema xmlns:xsd="http://www.w3.org/2001/XMLSchema" xmlns:xs="http://www.w3.org/2001/XMLSchema" xmlns:p="http://schemas.microsoft.com/office/2006/metadata/properties" xmlns:ns1="http://schemas.microsoft.com/sharepoint/v3" xmlns:ns3="3d66f52e-af98-460a-93ca-ddf37d61e5d6" xmlns:ns4="34f92d76-972f-40f7-83ba-9ff99395c1e2" targetNamespace="http://schemas.microsoft.com/office/2006/metadata/properties" ma:root="true" ma:fieldsID="295acc4d4c993f921b621d6233a89d61" ns1:_="" ns3:_="" ns4:_="">
     <xsd:import namespace="http://schemas.microsoft.com/sharepoint/v3"/>
@@ -10216,6 +10621,17 @@
 </ct:contentTypeSchema>
 </file>
 
+<file path=customXml/item2.xml><?xml version="1.0" encoding="utf-8"?>
+<p:properties xmlns:p="http://schemas.microsoft.com/office/2006/metadata/properties" xmlns:xsi="http://www.w3.org/2001/XMLSchema-instance" xmlns:pc="http://schemas.microsoft.com/office/infopath/2007/PartnerControls">
+  <documentManagement>
+    <_ip_UnifiedCompliancePolicyUIAction xmlns="http://schemas.microsoft.com/sharepoint/v3" xsi:nil="true"/>
+    <_STS_x0020_Hashtags xmlns="34f92d76-972f-40f7-83ba-9ff99395c1e2"/>
+    <_ip_UnifiedCompliancePolicyProperties xmlns="http://schemas.microsoft.com/sharepoint/v3" xsi:nil="true"/>
+    <MediaServiceKeyPoints xmlns="34f92d76-972f-40f7-83ba-9ff99395c1e2" xsi:nil="true"/>
+  </documentManagement>
+</p:properties>
+</file>
+
 <file path=customXml/item3.xml><?xml version="1.0" encoding="utf-8"?>
 <?mso-contentType ?>
 <FormTemplates xmlns="http://schemas.microsoft.com/sharepoint/v3/contenttype/forms">
@@ -10226,17 +10642,6 @@
 </file>
 
 <file path=customXml/itemProps1.xml><?xml version="1.0" encoding="utf-8"?>
-<ds:datastoreItem xmlns:ds="http://schemas.openxmlformats.org/officeDocument/2006/customXml" ds:itemID="{4B74C58F-4A19-4194-A5AC-1B7A48193F3B}">
-  <ds:schemaRefs>
-    <ds:schemaRef ds:uri="http://schemas.microsoft.com/office/2006/metadata/properties"/>
-    <ds:schemaRef ds:uri="http://schemas.microsoft.com/office/infopath/2007/PartnerControls"/>
-    <ds:schemaRef ds:uri="http://schemas.microsoft.com/sharepoint/v3"/>
-    <ds:schemaRef ds:uri="34f92d76-972f-40f7-83ba-9ff99395c1e2"/>
-  </ds:schemaRefs>
-</ds:datastoreItem>
-</file>
-
-<file path=customXml/itemProps2.xml><?xml version="1.0" encoding="utf-8"?>
 <ds:datastoreItem xmlns:ds="http://schemas.openxmlformats.org/officeDocument/2006/customXml" ds:itemID="{ED8C8AB5-384A-46A7-8A1F-A6A91F154ABF}">
   <ds:schemaRefs>
     <ds:schemaRef ds:uri="http://schemas.microsoft.com/office/2006/metadata/contentType"/>
@@ -10256,6 +10661,24 @@
 </ds:datastoreItem>
 </file>
 
+<file path=customXml/itemProps2.xml><?xml version="1.0" encoding="utf-8"?>
+<ds:datastoreItem xmlns:ds="http://schemas.openxmlformats.org/officeDocument/2006/customXml" ds:itemID="{4B74C58F-4A19-4194-A5AC-1B7A48193F3B}">
+  <ds:schemaRefs>
+    <ds:schemaRef ds:uri="http://purl.org/dc/terms/"/>
+    <ds:schemaRef ds:uri="http://schemas.microsoft.com/office/infopath/2007/PartnerControls"/>
+    <ds:schemaRef ds:uri="http://purl.org/dc/dcmitype/"/>
+    <ds:schemaRef ds:uri="http://schemas.microsoft.com/office/2006/documentManagement/types"/>
+    <ds:schemaRef ds:uri="http://purl.org/dc/elements/1.1/"/>
+    <ds:schemaRef ds:uri="http://schemas.microsoft.com/sharepoint/v3"/>
+    <ds:schemaRef ds:uri="http://schemas.openxmlformats.org/package/2006/metadata/core-properties"/>
+    <ds:schemaRef ds:uri="3d66f52e-af98-460a-93ca-ddf37d61e5d6"/>
+    <ds:schemaRef ds:uri="http://www.w3.org/XML/1998/namespace"/>
+    <ds:schemaRef ds:uri="34f92d76-972f-40f7-83ba-9ff99395c1e2"/>
+    <ds:schemaRef ds:uri="http://schemas.microsoft.com/office/2006/metadata/properties"/>
+  </ds:schemaRefs>
+</ds:datastoreItem>
+</file>
+
 <file path=customXml/itemProps3.xml><?xml version="1.0" encoding="utf-8"?>
 <ds:datastoreItem xmlns:ds="http://schemas.openxmlformats.org/officeDocument/2006/customXml" ds:itemID="{FB596F9F-BD71-4894-B68F-EE12B0B747D5}">
   <ds:schemaRefs>

</xml_diff>